<commit_message>
modification grille de comparaison
</commit_message>
<xml_diff>
--- a/Template GRILLES de COMPARAISON.pptx
+++ b/Template GRILLES de COMPARAISON.pptx
@@ -19491,14 +19491,14 @@
           <p:nvPr>
             <p:extLst>
               <p:ext uri="{D42A27DB-BD31-4B8C-83A1-F6EECF244321}">
-                <p14:modId xmlns:p14="http://schemas.microsoft.com/office/powerpoint/2010/main" val="3617519886"/>
+                <p14:modId xmlns:p14="http://schemas.microsoft.com/office/powerpoint/2010/main" val="3249840254"/>
               </p:ext>
             </p:extLst>
           </p:nvPr>
         </p:nvGraphicFramePr>
         <p:xfrm>
           <a:off x="211938" y="492919"/>
-          <a:ext cx="8932050" cy="4784120"/>
+          <a:ext cx="8932050" cy="4796066"/>
         </p:xfrm>
         <a:graphic>
           <a:graphicData uri="http://schemas.openxmlformats.org/drawingml/2006/table">
@@ -19914,7 +19914,16 @@
                           <a:cs typeface="Averia Gruesa Libre"/>
                           <a:sym typeface="Averia Gruesa Libre"/>
                         </a:rPr>
-                        <a:t>SageMath, math</a:t>
+                        <a:t>SageMath</a:t>
+                      </a:r>
+                      <a:r>
+                        <a:rPr lang="fr" sz="900">
+                          <a:latin typeface="Averia Gruesa Libre"/>
+                          <a:ea typeface="Averia Gruesa Libre"/>
+                          <a:cs typeface="Averia Gruesa Libre"/>
+                          <a:sym typeface="Averia Gruesa Libre"/>
+                        </a:rPr>
+                        <a:t>, math, wolfram</a:t>
                       </a:r>
                       <a:endParaRPr sz="900" dirty="0">
                         <a:latin typeface="Averia Gruesa Libre"/>
@@ -20836,6 +20845,54 @@
                     <a:bodyPr/>
                     <a:lstStyle/>
                     <a:p>
+                      <a:pPr marL="0" marR="0" lvl="0" indent="0" algn="l" defTabSz="914400" rtl="0" eaLnBrk="1" fontAlgn="auto" latinLnBrk="0" hangingPunct="1">
+                        <a:lnSpc>
+                          <a:spcPct val="100000"/>
+                        </a:lnSpc>
+                        <a:spcBef>
+                          <a:spcPts val="0"/>
+                        </a:spcBef>
+                        <a:spcAft>
+                          <a:spcPts val="0"/>
+                        </a:spcAft>
+                        <a:buClr>
+                          <a:srgbClr val="000000"/>
+                        </a:buClr>
+                        <a:buSzTx/>
+                        <a:buFont typeface="Arial"/>
+                        <a:buNone/>
+                        <a:tabLst/>
+                        <a:defRPr/>
+                      </a:pPr>
+                      <a:r>
+                        <a:rPr lang="fr-FR" sz="900" dirty="0">
+                          <a:latin typeface="Averia Gruesa Libre"/>
+                          <a:ea typeface="Averia Gruesa Libre"/>
+                          <a:cs typeface="Averia Gruesa Libre"/>
+                          <a:sym typeface="Averia Gruesa Libre"/>
+                        </a:rPr>
+                        <a:t>Python Software </a:t>
+                      </a:r>
+                      <a:r>
+                        <a:rPr lang="fr-FR" sz="900" dirty="0" err="1">
+                          <a:latin typeface="Averia Gruesa Libre"/>
+                          <a:ea typeface="Averia Gruesa Libre"/>
+                          <a:cs typeface="Averia Gruesa Libre"/>
+                          <a:sym typeface="Averia Gruesa Libre"/>
+                        </a:rPr>
+                        <a:t>Foundation</a:t>
+                      </a:r>
+                      <a:r>
+                        <a:rPr lang="fr-FR" sz="900" dirty="0">
+                          <a:latin typeface="Averia Gruesa Libre"/>
+                          <a:ea typeface="Averia Gruesa Libre"/>
+                          <a:cs typeface="Averia Gruesa Libre"/>
+                          <a:sym typeface="Averia Gruesa Libre"/>
+                        </a:rPr>
+                        <a:t> License</a:t>
+                      </a:r>
+                    </a:p>
+                    <a:p>
                       <a:pPr marL="0" lvl="0" indent="0" algn="l" rtl="0">
                         <a:spcBef>
                           <a:spcPts val="0"/>
@@ -20845,15 +20902,6 @@
                         </a:spcAft>
                         <a:buNone/>
                       </a:pPr>
-                      <a:r>
-                        <a:rPr lang="fr-FR" sz="900" dirty="0">
-                          <a:latin typeface="Averia Gruesa Libre"/>
-                          <a:ea typeface="Averia Gruesa Libre"/>
-                          <a:cs typeface="Averia Gruesa Libre"/>
-                          <a:sym typeface="Averia Gruesa Libre"/>
-                        </a:rPr>
-                        <a:t>Aucune licence n’est requise pour utiliser Python</a:t>
-                      </a:r>
                       <a:endParaRPr sz="900" dirty="0">
                         <a:latin typeface="Averia Gruesa Libre"/>
                         <a:ea typeface="Averia Gruesa Libre"/>
@@ -20908,8 +20956,23 @@
                           <a:cs typeface="Averia Gruesa Libre"/>
                           <a:sym typeface="Averia Gruesa Libre"/>
                         </a:rPr>
-                        <a:t>Aucune licence n’est requise pour utiliser le C++</a:t>
+                        <a:t>Standard C++ </a:t>
                       </a:r>
+                      <a:r>
+                        <a:rPr lang="fr-FR" sz="900" dirty="0" err="1">
+                          <a:latin typeface="Averia Gruesa Libre"/>
+                          <a:ea typeface="Averia Gruesa Libre"/>
+                          <a:cs typeface="Averia Gruesa Libre"/>
+                          <a:sym typeface="Averia Gruesa Libre"/>
+                        </a:rPr>
+                        <a:t>Foundation</a:t>
+                      </a:r>
+                      <a:endParaRPr lang="fr-FR" sz="900" dirty="0">
+                        <a:latin typeface="Averia Gruesa Libre"/>
+                        <a:ea typeface="Averia Gruesa Libre"/>
+                        <a:cs typeface="Averia Gruesa Libre"/>
+                        <a:sym typeface="Averia Gruesa Libre"/>
+                      </a:endParaRPr>
                     </a:p>
                   </a:txBody>
                   <a:tcPr marL="68575" marR="68575" marT="68575" marB="68575"/>

</xml_diff>